<commit_message>
Diagramas de flujo y ejecución actualizados
</commit_message>
<xml_diff>
--- a/ai_docs/Diagramas.pptx
+++ b/ai_docs/Diagramas.pptx
@@ -207,7 +207,7 @@
           <a:p>
             <a:fld id="{256C9FCD-D82F-3149-9EC0-4EF75A95459C}" type="datetimeFigureOut">
               <a:rPr lang="es-ES" smtClean="0"/>
-              <a:t>2/6/22</a:t>
+              <a:t>3/6/22</a:t>
             </a:fld>
             <a:endParaRPr lang="es-ES"/>
           </a:p>
@@ -705,7 +705,7 @@
           <a:p>
             <a:fld id="{E897FFBC-46E8-D744-98E8-8525DA8E3C89}" type="datetimeFigureOut">
               <a:rPr lang="es-ES" smtClean="0"/>
-              <a:t>2/6/22</a:t>
+              <a:t>3/6/22</a:t>
             </a:fld>
             <a:endParaRPr lang="es-ES"/>
           </a:p>
@@ -903,7 +903,7 @@
           <a:p>
             <a:fld id="{E897FFBC-46E8-D744-98E8-8525DA8E3C89}" type="datetimeFigureOut">
               <a:rPr lang="es-ES" smtClean="0"/>
-              <a:t>2/6/22</a:t>
+              <a:t>3/6/22</a:t>
             </a:fld>
             <a:endParaRPr lang="es-ES"/>
           </a:p>
@@ -1111,7 +1111,7 @@
           <a:p>
             <a:fld id="{E897FFBC-46E8-D744-98E8-8525DA8E3C89}" type="datetimeFigureOut">
               <a:rPr lang="es-ES" smtClean="0"/>
-              <a:t>2/6/22</a:t>
+              <a:t>3/6/22</a:t>
             </a:fld>
             <a:endParaRPr lang="es-ES"/>
           </a:p>
@@ -1309,7 +1309,7 @@
           <a:p>
             <a:fld id="{E897FFBC-46E8-D744-98E8-8525DA8E3C89}" type="datetimeFigureOut">
               <a:rPr lang="es-ES" smtClean="0"/>
-              <a:t>2/6/22</a:t>
+              <a:t>3/6/22</a:t>
             </a:fld>
             <a:endParaRPr lang="es-ES"/>
           </a:p>
@@ -1584,7 +1584,7 @@
           <a:p>
             <a:fld id="{E897FFBC-46E8-D744-98E8-8525DA8E3C89}" type="datetimeFigureOut">
               <a:rPr lang="es-ES" smtClean="0"/>
-              <a:t>2/6/22</a:t>
+              <a:t>3/6/22</a:t>
             </a:fld>
             <a:endParaRPr lang="es-ES"/>
           </a:p>
@@ -1849,7 +1849,7 @@
           <a:p>
             <a:fld id="{E897FFBC-46E8-D744-98E8-8525DA8E3C89}" type="datetimeFigureOut">
               <a:rPr lang="es-ES" smtClean="0"/>
-              <a:t>2/6/22</a:t>
+              <a:t>3/6/22</a:t>
             </a:fld>
             <a:endParaRPr lang="es-ES"/>
           </a:p>
@@ -2261,7 +2261,7 @@
           <a:p>
             <a:fld id="{E897FFBC-46E8-D744-98E8-8525DA8E3C89}" type="datetimeFigureOut">
               <a:rPr lang="es-ES" smtClean="0"/>
-              <a:t>2/6/22</a:t>
+              <a:t>3/6/22</a:t>
             </a:fld>
             <a:endParaRPr lang="es-ES"/>
           </a:p>
@@ -2402,7 +2402,7 @@
           <a:p>
             <a:fld id="{E897FFBC-46E8-D744-98E8-8525DA8E3C89}" type="datetimeFigureOut">
               <a:rPr lang="es-ES" smtClean="0"/>
-              <a:t>2/6/22</a:t>
+              <a:t>3/6/22</a:t>
             </a:fld>
             <a:endParaRPr lang="es-ES"/>
           </a:p>
@@ -2515,7 +2515,7 @@
           <a:p>
             <a:fld id="{E897FFBC-46E8-D744-98E8-8525DA8E3C89}" type="datetimeFigureOut">
               <a:rPr lang="es-ES" smtClean="0"/>
-              <a:t>2/6/22</a:t>
+              <a:t>3/6/22</a:t>
             </a:fld>
             <a:endParaRPr lang="es-ES"/>
           </a:p>
@@ -2826,7 +2826,7 @@
           <a:p>
             <a:fld id="{E897FFBC-46E8-D744-98E8-8525DA8E3C89}" type="datetimeFigureOut">
               <a:rPr lang="es-ES" smtClean="0"/>
-              <a:t>2/6/22</a:t>
+              <a:t>3/6/22</a:t>
             </a:fld>
             <a:endParaRPr lang="es-ES"/>
           </a:p>
@@ -3114,7 +3114,7 @@
           <a:p>
             <a:fld id="{E897FFBC-46E8-D744-98E8-8525DA8E3C89}" type="datetimeFigureOut">
               <a:rPr lang="es-ES" smtClean="0"/>
-              <a:t>2/6/22</a:t>
+              <a:t>3/6/22</a:t>
             </a:fld>
             <a:endParaRPr lang="es-ES"/>
           </a:p>
@@ -3355,7 +3355,7 @@
           <a:p>
             <a:fld id="{E897FFBC-46E8-D744-98E8-8525DA8E3C89}" type="datetimeFigureOut">
               <a:rPr lang="es-ES" smtClean="0"/>
-              <a:t>2/6/22</a:t>
+              <a:t>3/6/22</a:t>
             </a:fld>
             <a:endParaRPr lang="es-ES"/>
           </a:p>
@@ -7806,7 +7806,7 @@
         </p:nvSpPr>
         <p:spPr>
           <a:xfrm>
-            <a:off x="2662642" y="2553130"/>
+            <a:off x="2662642" y="2918888"/>
             <a:ext cx="3419698" cy="230832"/>
           </a:xfrm>
           <a:prstGeom prst="rect">
@@ -7844,7 +7844,7 @@
         </p:nvCxnSpPr>
         <p:spPr>
           <a:xfrm>
-            <a:off x="941187" y="1534690"/>
+            <a:off x="941187" y="1371061"/>
             <a:ext cx="1726386" cy="0"/>
           </a:xfrm>
           <a:prstGeom prst="straightConnector1">
@@ -7886,7 +7886,7 @@
         </p:nvSpPr>
         <p:spPr>
           <a:xfrm>
-            <a:off x="954001" y="1167400"/>
+            <a:off x="954001" y="994145"/>
             <a:ext cx="1713571" cy="369332"/>
           </a:xfrm>
           <a:prstGeom prst="rect">
@@ -7928,7 +7928,7 @@
         </p:nvCxnSpPr>
         <p:spPr>
           <a:xfrm flipH="1">
-            <a:off x="2675001" y="2547832"/>
+            <a:off x="2675001" y="2913590"/>
             <a:ext cx="3419698" cy="0"/>
           </a:xfrm>
           <a:prstGeom prst="straightConnector1">
@@ -8158,8 +8158,8 @@
         </p:nvSpPr>
         <p:spPr>
           <a:xfrm>
-            <a:off x="269034" y="1170114"/>
-            <a:ext cx="6510641" cy="2176322"/>
+            <a:off x="1981755" y="1535872"/>
+            <a:ext cx="4797920" cy="2176322"/>
           </a:xfrm>
           <a:prstGeom prst="rect">
             <a:avLst/>
@@ -8210,7 +8210,7 @@
         </p:nvCxnSpPr>
         <p:spPr>
           <a:xfrm>
-            <a:off x="2672504" y="1637310"/>
+            <a:off x="2672504" y="2003068"/>
             <a:ext cx="1713569" cy="0"/>
           </a:xfrm>
           <a:prstGeom prst="straightConnector1">
@@ -8254,7 +8254,7 @@
         </p:nvCxnSpPr>
         <p:spPr>
           <a:xfrm flipH="1" flipV="1">
-            <a:off x="2667054" y="1768639"/>
+            <a:off x="2667054" y="2134397"/>
             <a:ext cx="1726386" cy="0"/>
           </a:xfrm>
           <a:prstGeom prst="straightConnector1">
@@ -8296,7 +8296,7 @@
         </p:nvSpPr>
         <p:spPr>
           <a:xfrm>
-            <a:off x="2672503" y="1782595"/>
+            <a:off x="2672503" y="2148353"/>
             <a:ext cx="1708637" cy="230832"/>
           </a:xfrm>
           <a:prstGeom prst="rect">
@@ -8332,7 +8332,7 @@
         </p:nvSpPr>
         <p:spPr>
           <a:xfrm>
-            <a:off x="2675001" y="1406449"/>
+            <a:off x="2675001" y="1772207"/>
             <a:ext cx="1708637" cy="230832"/>
           </a:xfrm>
           <a:prstGeom prst="rect">
@@ -8372,7 +8372,7 @@
         </p:nvSpPr>
         <p:spPr>
           <a:xfrm>
-            <a:off x="1982604" y="2082002"/>
+            <a:off x="1982604" y="2447760"/>
             <a:ext cx="4797067" cy="757101"/>
           </a:xfrm>
           <a:prstGeom prst="rect">
@@ -8426,7 +8426,7 @@
         </p:nvCxnSpPr>
         <p:spPr>
           <a:xfrm>
-            <a:off x="2667054" y="2383834"/>
+            <a:off x="2667054" y="2749592"/>
             <a:ext cx="3427657" cy="0"/>
           </a:xfrm>
           <a:prstGeom prst="straightConnector1">
@@ -8468,7 +8468,7 @@
         </p:nvSpPr>
         <p:spPr>
           <a:xfrm>
-            <a:off x="2655275" y="2148018"/>
+            <a:off x="2655275" y="2513776"/>
             <a:ext cx="3439424" cy="230832"/>
           </a:xfrm>
           <a:prstGeom prst="rect">
@@ -8516,7 +8516,7 @@
         </p:nvCxnSpPr>
         <p:spPr>
           <a:xfrm flipH="1">
-            <a:off x="954001" y="3066232"/>
+            <a:off x="954001" y="3845876"/>
             <a:ext cx="1718502" cy="0"/>
           </a:xfrm>
           <a:prstGeom prst="straightConnector1">
@@ -8558,7 +8558,7 @@
         </p:nvSpPr>
         <p:spPr>
           <a:xfrm>
-            <a:off x="949071" y="3068714"/>
+            <a:off x="949071" y="3857983"/>
             <a:ext cx="1730870" cy="230832"/>
           </a:xfrm>
           <a:prstGeom prst="rect">
@@ -8594,7 +8594,7 @@
         </p:nvSpPr>
         <p:spPr>
           <a:xfrm>
-            <a:off x="4989416" y="1179494"/>
+            <a:off x="4989416" y="1545252"/>
             <a:ext cx="1792515" cy="369332"/>
           </a:xfrm>
           <a:prstGeom prst="rect">
@@ -8646,7 +8646,7 @@
         </p:nvSpPr>
         <p:spPr>
           <a:xfrm>
-            <a:off x="5847831" y="2088383"/>
+            <a:off x="5847831" y="2454141"/>
             <a:ext cx="926193" cy="230832"/>
           </a:xfrm>
           <a:prstGeom prst="rect">
@@ -8692,7 +8692,7 @@
         </p:nvCxnSpPr>
         <p:spPr>
           <a:xfrm>
-            <a:off x="961446" y="3891395"/>
+            <a:off x="961446" y="4401531"/>
             <a:ext cx="6842168" cy="0"/>
           </a:xfrm>
           <a:prstGeom prst="straightConnector1">
@@ -8734,7 +8734,7 @@
         </p:nvSpPr>
         <p:spPr>
           <a:xfrm>
-            <a:off x="942360" y="3661203"/>
+            <a:off x="942360" y="4171339"/>
             <a:ext cx="6854008" cy="230832"/>
           </a:xfrm>
           <a:prstGeom prst="rect">
@@ -8774,8 +8774,8 @@
         </p:nvSpPr>
         <p:spPr>
           <a:xfrm>
-            <a:off x="269034" y="3646500"/>
-            <a:ext cx="11653930" cy="2637621"/>
+            <a:off x="269034" y="4156637"/>
+            <a:ext cx="11653930" cy="2312904"/>
           </a:xfrm>
           <a:prstGeom prst="rect">
             <a:avLst/>
@@ -8812,87 +8812,6 @@
           </a:p>
         </p:txBody>
       </p:sp>
-      <p:cxnSp>
-        <p:nvCxnSpPr>
-          <p:cNvPr id="53" name="Conector recto de flecha 52">
-            <a:extLst>
-              <a:ext uri="{FF2B5EF4-FFF2-40B4-BE49-F238E27FC236}">
-                <a16:creationId xmlns:a16="http://schemas.microsoft.com/office/drawing/2014/main" id="{B16813BC-28CF-3B80-C116-21E89282B325}"/>
-              </a:ext>
-            </a:extLst>
-          </p:cNvPr>
-          <p:cNvCxnSpPr>
-            <a:cxnSpLocks/>
-          </p:cNvCxnSpPr>
-          <p:nvPr/>
-        </p:nvCxnSpPr>
-        <p:spPr>
-          <a:xfrm flipH="1">
-            <a:off x="961446" y="4043556"/>
-            <a:ext cx="6842168" cy="0"/>
-          </a:xfrm>
-          <a:prstGeom prst="straightConnector1">
-            <a:avLst/>
-          </a:prstGeom>
-          <a:ln>
-            <a:solidFill>
-              <a:schemeClr val="tx1"/>
-            </a:solidFill>
-            <a:tailEnd type="triangle"/>
-          </a:ln>
-        </p:spPr>
-        <p:style>
-          <a:lnRef idx="1">
-            <a:schemeClr val="accent1"/>
-          </a:lnRef>
-          <a:fillRef idx="0">
-            <a:schemeClr val="accent1"/>
-          </a:fillRef>
-          <a:effectRef idx="0">
-            <a:schemeClr val="accent1"/>
-          </a:effectRef>
-          <a:fontRef idx="minor">
-            <a:schemeClr val="tx1"/>
-          </a:fontRef>
-        </p:style>
-      </p:cxnSp>
-      <p:sp>
-        <p:nvSpPr>
-          <p:cNvPr id="54" name="CuadroTexto 53">
-            <a:extLst>
-              <a:ext uri="{FF2B5EF4-FFF2-40B4-BE49-F238E27FC236}">
-                <a16:creationId xmlns:a16="http://schemas.microsoft.com/office/drawing/2014/main" id="{D78AF875-D046-49DD-56CB-5807016249EA}"/>
-              </a:ext>
-            </a:extLst>
-          </p:cNvPr>
-          <p:cNvSpPr txBox="1"/>
-          <p:nvPr/>
-        </p:nvSpPr>
-        <p:spPr>
-          <a:xfrm>
-            <a:off x="969113" y="4050658"/>
-            <a:ext cx="6854008" cy="230832"/>
-          </a:xfrm>
-          <a:prstGeom prst="rect">
-            <a:avLst/>
-          </a:prstGeom>
-          <a:noFill/>
-        </p:spPr>
-        <p:txBody>
-          <a:bodyPr wrap="square" rtlCol="0">
-            <a:spAutoFit/>
-          </a:bodyPr>
-          <a:lstStyle/>
-          <a:p>
-            <a:pPr algn="ctr"/>
-            <a:r>
-              <a:rPr lang="en-US" sz="900" dirty="0" err="1"/>
-              <a:t>unit_test</a:t>
-            </a:r>
-            <a:endParaRPr lang="en-US" sz="900" dirty="0"/>
-          </a:p>
-        </p:txBody>
-      </p:sp>
       <p:sp>
         <p:nvSpPr>
           <p:cNvPr id="55" name="Rectángulo 54">
@@ -8907,7 +8826,7 @@
         </p:nvSpPr>
         <p:spPr>
           <a:xfrm>
-            <a:off x="7122170" y="4299983"/>
+            <a:off x="7122170" y="4579116"/>
             <a:ext cx="4800794" cy="1456811"/>
           </a:xfrm>
           <a:prstGeom prst="rect">
@@ -8959,7 +8878,7 @@
         </p:nvSpPr>
         <p:spPr>
           <a:xfrm>
-            <a:off x="10183663" y="3650264"/>
+            <a:off x="10183663" y="4160400"/>
             <a:ext cx="1739302" cy="369332"/>
           </a:xfrm>
           <a:prstGeom prst="rect">
@@ -9011,7 +8930,7 @@
         </p:nvSpPr>
         <p:spPr>
           <a:xfrm>
-            <a:off x="9565941" y="4304305"/>
+            <a:off x="9565941" y="4583438"/>
             <a:ext cx="2347780" cy="369332"/>
           </a:xfrm>
           <a:prstGeom prst="rect">
@@ -9349,7 +9268,7 @@
         </p:nvCxnSpPr>
         <p:spPr>
           <a:xfrm>
-            <a:off x="7819650" y="4541998"/>
+            <a:off x="7819650" y="4821131"/>
             <a:ext cx="1697326" cy="0"/>
           </a:xfrm>
           <a:prstGeom prst="straightConnector1">
@@ -9391,7 +9310,7 @@
         </p:nvSpPr>
         <p:spPr>
           <a:xfrm>
-            <a:off x="7814603" y="4305133"/>
+            <a:off x="7814603" y="4584266"/>
             <a:ext cx="1699904" cy="230832"/>
           </a:xfrm>
           <a:prstGeom prst="rect">
@@ -9431,7 +9350,7 @@
         </p:nvCxnSpPr>
         <p:spPr>
           <a:xfrm flipH="1">
-            <a:off x="7810249" y="4688794"/>
+            <a:off x="7810249" y="4967927"/>
             <a:ext cx="1723644" cy="0"/>
           </a:xfrm>
           <a:prstGeom prst="straightConnector1">
@@ -9473,7 +9392,7 @@
         </p:nvSpPr>
         <p:spPr>
           <a:xfrm>
-            <a:off x="7814603" y="4698564"/>
+            <a:off x="7814603" y="4977697"/>
             <a:ext cx="1699904" cy="230832"/>
           </a:xfrm>
           <a:prstGeom prst="rect">
@@ -9614,7 +9533,7 @@
         </p:nvCxnSpPr>
         <p:spPr>
           <a:xfrm>
-            <a:off x="7817458" y="5127674"/>
+            <a:off x="7817458" y="5406807"/>
             <a:ext cx="3427221" cy="0"/>
           </a:xfrm>
           <a:prstGeom prst="straightConnector1">
@@ -9656,7 +9575,7 @@
         </p:nvCxnSpPr>
         <p:spPr>
           <a:xfrm flipH="1">
-            <a:off x="7819650" y="5310116"/>
+            <a:off x="7819650" y="5589249"/>
             <a:ext cx="3437845" cy="0"/>
           </a:xfrm>
           <a:prstGeom prst="straightConnector1">
@@ -9698,7 +9617,7 @@
         </p:nvSpPr>
         <p:spPr>
           <a:xfrm>
-            <a:off x="7819400" y="4892352"/>
+            <a:off x="7819400" y="5171485"/>
             <a:ext cx="3437845" cy="230832"/>
           </a:xfrm>
           <a:prstGeom prst="rect">
@@ -9746,7 +9665,7 @@
         </p:nvSpPr>
         <p:spPr>
           <a:xfrm>
-            <a:off x="7817457" y="5322021"/>
+            <a:off x="7817457" y="5601154"/>
             <a:ext cx="3427221" cy="230832"/>
           </a:xfrm>
           <a:prstGeom prst="rect">
@@ -9782,7 +9701,7 @@
         </p:nvCxnSpPr>
         <p:spPr>
           <a:xfrm flipH="1">
-            <a:off x="950152" y="5929659"/>
+            <a:off x="950152" y="6208792"/>
             <a:ext cx="6876270" cy="0"/>
           </a:xfrm>
           <a:prstGeom prst="straightConnector1">
@@ -9824,7 +9743,7 @@
         </p:nvSpPr>
         <p:spPr>
           <a:xfrm>
-            <a:off x="941188" y="5941801"/>
+            <a:off x="941188" y="6220934"/>
             <a:ext cx="6885234" cy="230832"/>
           </a:xfrm>
           <a:prstGeom prst="rect">
@@ -10582,18 +10501,18 @@
 </file>
 
 <file path=customXml/item2.xml><?xml version="1.0" encoding="utf-8"?>
+<p:properties xmlns:p="http://schemas.microsoft.com/office/2006/metadata/properties" xmlns:xsi="http://www.w3.org/2001/XMLSchema-instance" xmlns:pc="http://schemas.microsoft.com/office/infopath/2007/PartnerControls">
+  <documentManagement/>
+</p:properties>
+</file>
+
+<file path=customXml/item3.xml><?xml version="1.0" encoding="utf-8"?>
 <?mso-contentType ?>
 <FormTemplates xmlns="http://schemas.microsoft.com/sharepoint/v3/contenttype/forms">
   <Display>DocumentLibraryForm</Display>
   <Edit>DocumentLibraryForm</Edit>
   <New>DocumentLibraryForm</New>
 </FormTemplates>
-</file>
-
-<file path=customXml/item3.xml><?xml version="1.0" encoding="utf-8"?>
-<p:properties xmlns:p="http://schemas.microsoft.com/office/2006/metadata/properties" xmlns:xsi="http://www.w3.org/2001/XMLSchema-instance" xmlns:pc="http://schemas.microsoft.com/office/infopath/2007/PartnerControls">
-  <documentManagement/>
-</p:properties>
 </file>
 
 <file path=customXml/itemProps1.xml><?xml version="1.0" encoding="utf-8"?>
@@ -10615,14 +10534,6 @@
 </file>
 
 <file path=customXml/itemProps2.xml><?xml version="1.0" encoding="utf-8"?>
-<ds:datastoreItem xmlns:ds="http://schemas.openxmlformats.org/officeDocument/2006/customXml" ds:itemID="{4BE6E503-42EC-418D-BECE-EB0FFCF85516}">
-  <ds:schemaRefs>
-    <ds:schemaRef ds:uri="http://schemas.microsoft.com/sharepoint/v3/contenttype/forms"/>
-  </ds:schemaRefs>
-</ds:datastoreItem>
-</file>
-
-<file path=customXml/itemProps3.xml><?xml version="1.0" encoding="utf-8"?>
 <ds:datastoreItem xmlns:ds="http://schemas.openxmlformats.org/officeDocument/2006/customXml" ds:itemID="{AFE80E72-7864-4337-90CD-FB4FD5882C72}">
   <ds:schemaRefs>
     <ds:schemaRef ds:uri="http://purl.org/dc/dcmitype/"/>
@@ -10635,4 +10546,12 @@
     <ds:schemaRef ds:uri="http://www.w3.org/XML/1998/namespace"/>
   </ds:schemaRefs>
 </ds:datastoreItem>
+</file>
+
+<file path=customXml/itemProps3.xml><?xml version="1.0" encoding="utf-8"?>
+<ds:datastoreItem xmlns:ds="http://schemas.openxmlformats.org/officeDocument/2006/customXml" ds:itemID="{4BE6E503-42EC-418D-BECE-EB0FFCF85516}">
+  <ds:schemaRefs>
+    <ds:schemaRef ds:uri="http://schemas.microsoft.com/sharepoint/v3/contenttype/forms"/>
+  </ds:schemaRefs>
+</ds:datastoreItem>
 </file>
</xml_diff>

<commit_message>
Test models y documentación actualizados
</commit_message>
<xml_diff>
--- a/ai_docs/Diagramas.pptx
+++ b/ai_docs/Diagramas.pptx
@@ -10019,32 +10019,42 @@
               <a:rPr lang="es-ES" sz="2000" dirty="0"/>
               <a:t>. En comparación con otros modelos, tiene una cantidad mucho menor de parámetros pero el rendimiento que ofrece es acorde a lo esperado por las métricas del modelo entrenado.</a:t>
             </a:r>
-            <a:endParaRPr lang="es-ES" sz="2000" i="1" dirty="0"/>
-          </a:p>
-          <a:p>
-            <a:pPr algn="just"/>
-            <a:r>
-              <a:rPr lang="es-ES" sz="2000" dirty="0"/>
-              <a:t>Está diseñado con una red neuronal </a:t>
-            </a:r>
-            <a:r>
-              <a:rPr lang="es-ES" sz="2000" i="1" dirty="0" err="1"/>
-              <a:t>transformer</a:t>
-            </a:r>
-            <a:r>
-              <a:rPr lang="es-ES" sz="2000" i="1" dirty="0"/>
-              <a:t> </a:t>
-            </a:r>
-            <a:r>
-              <a:rPr lang="es-ES" sz="2000" dirty="0"/>
-              <a:t> que adapta la arquitectura de GPT-2. Al ejecutarse devuelve el conjunto de enunciados de problemas junto con sus soluciones en código. Utiliza aproximadamente 1GB de la RAM (5.21GB ~ 6.62GB), siendo muy inferior a la capacidad máxima de la GPU (16GB), con la cuál se pretende ejecutar los modelos escogidos definitivos.</a:t>
-            </a:r>
           </a:p>
           <a:p>
             <a:pPr marL="0" indent="0" algn="just">
               <a:buNone/>
             </a:pPr>
+            <a:endParaRPr lang="es-ES" sz="2000" i="1" dirty="0"/>
+          </a:p>
+          <a:p>
+            <a:pPr algn="just"/>
+            <a:r>
+              <a:rPr lang="es-ES" sz="2000" dirty="0"/>
+              <a:t>Está diseñado con una red neuronal </a:t>
+            </a:r>
+            <a:r>
+              <a:rPr lang="es-ES" sz="2000" i="1" dirty="0" err="1"/>
+              <a:t>transformer</a:t>
+            </a:r>
+            <a:r>
+              <a:rPr lang="es-ES" sz="2000" i="1" dirty="0"/>
+              <a:t> </a:t>
+            </a:r>
+            <a:r>
+              <a:rPr lang="es-ES" sz="2000" dirty="0"/>
+              <a:t>que adapta la arquitectura de GPT-2. Al ejecutarse devuelve el conjunto de enunciados de problemas junto con sus soluciones en código. Utiliza aproximadamente 1GB de la RAM (5.21GB ~ 6.62GB), siendo muy inferior a la capacidad máxima de la GPU (16GB), con la cuál se pretende ejecutar los modelos escogidos definitivos.</a:t>
+            </a:r>
+          </a:p>
+          <a:p>
+            <a:pPr algn="just"/>
             <a:endParaRPr lang="es-ES" sz="2000" dirty="0"/>
+          </a:p>
+          <a:p>
+            <a:pPr algn="just"/>
+            <a:r>
+              <a:rPr lang="es-ES" sz="2000" dirty="0"/>
+              <a:t>Si se lleva a cabo una prueba de rendimiento con la GPU, el modelo sigue ejecutándose de manera correcta ocupando un espacio de 2676MiB de los 16384MiB, es decir, 2.8GB de los 17.17GB totales, lo que se traduce en un 16.31% de uso de la GPU. Conviene resaltar dicho dato ya que servirá como guía para probar el rendimiento de otros modelos.</a:t>
+            </a:r>
           </a:p>
         </p:txBody>
       </p:sp>

</xml_diff>